<commit_message>
created file for refactoring and minor changes to other documentation files
</commit_message>
<xml_diff>
--- a/Documentation Folder/Implement the New Spatial Pattern Learning Experiment Presentaion.pptx
+++ b/Documentation Folder/Implement the New Spatial Pattern Learning Experiment Presentaion.pptx
@@ -11558,11 +11558,11 @@
   <p:clrMapOvr>
     <a:masterClrMapping/>
   </p:clrMapOvr>
-  <mc:AlternateContent xmlns:mc="http://schemas.openxmlformats.org/markup-compatibility/2006">
-    <mc:Choice xmlns:p14="http://schemas.microsoft.com/office/powerpoint/2010/main" Requires="p14">
+  <mc:AlternateContent xmlns:mc="http://schemas.openxmlformats.org/markup-compatibility/2006" xmlns:p14="http://schemas.microsoft.com/office/powerpoint/2010/main">
+    <mc:Choice Requires="p14">
       <p:transition spd="slow" p14:dur="2000" advTm="28014"/>
     </mc:Choice>
-    <mc:Fallback>
+    <mc:Fallback xmlns="">
       <p:transition spd="slow" advTm="28014"/>
     </mc:Fallback>
   </mc:AlternateContent>
@@ -12373,7 +12373,7 @@
         </p:nvSpPr>
         <p:spPr>
           <a:xfrm>
-            <a:off x="786909" y="1176298"/>
+            <a:off x="560767" y="588149"/>
             <a:ext cx="7560652" cy="584775"/>
           </a:xfrm>
           <a:prstGeom prst="rect">
@@ -14027,7 +14027,7 @@
                 <a:ea typeface="+mn-ea"/>
                 <a:cs typeface="Times New Roman" pitchFamily="18"/>
               </a:rPr>
-              <a:t>Investigation of Inactive mini-columns</a:t>
+              <a:t>Investigation of Inactive Mini-columns</a:t>
             </a:r>
           </a:p>
         </p:txBody>

</xml_diff>